<commit_message>
Implemented the smaller changes from the official corrections
</commit_message>
<xml_diff>
--- a/MOF mCherrry expression figure/mCherry expression graph.pptx
+++ b/MOF mCherrry expression figure/mCherry expression graph.pptx
@@ -2167,7 +2167,7 @@
           <a:p>
             <a:fld id="{C5F7F1F4-5C2A-4188-9FA5-5E04CFA8CF56}" type="datetimeFigureOut">
               <a:rPr lang="en-GB" smtClean="0"/>
-              <a:t>31/08/2018</a:t>
+              <a:t>09/06/2019</a:t>
             </a:fld>
             <a:endParaRPr lang="en-GB"/>
           </a:p>
@@ -2367,7 +2367,7 @@
           <a:p>
             <a:fld id="{C5F7F1F4-5C2A-4188-9FA5-5E04CFA8CF56}" type="datetimeFigureOut">
               <a:rPr lang="en-GB" smtClean="0"/>
-              <a:t>31/08/2018</a:t>
+              <a:t>09/06/2019</a:t>
             </a:fld>
             <a:endParaRPr lang="en-GB"/>
           </a:p>
@@ -2577,7 +2577,7 @@
           <a:p>
             <a:fld id="{C5F7F1F4-5C2A-4188-9FA5-5E04CFA8CF56}" type="datetimeFigureOut">
               <a:rPr lang="en-GB" smtClean="0"/>
-              <a:t>31/08/2018</a:t>
+              <a:t>09/06/2019</a:t>
             </a:fld>
             <a:endParaRPr lang="en-GB"/>
           </a:p>
@@ -2777,7 +2777,7 @@
           <a:p>
             <a:fld id="{C5F7F1F4-5C2A-4188-9FA5-5E04CFA8CF56}" type="datetimeFigureOut">
               <a:rPr lang="en-GB" smtClean="0"/>
-              <a:t>31/08/2018</a:t>
+              <a:t>09/06/2019</a:t>
             </a:fld>
             <a:endParaRPr lang="en-GB"/>
           </a:p>
@@ -3053,7 +3053,7 @@
           <a:p>
             <a:fld id="{C5F7F1F4-5C2A-4188-9FA5-5E04CFA8CF56}" type="datetimeFigureOut">
               <a:rPr lang="en-GB" smtClean="0"/>
-              <a:t>31/08/2018</a:t>
+              <a:t>09/06/2019</a:t>
             </a:fld>
             <a:endParaRPr lang="en-GB"/>
           </a:p>
@@ -3321,7 +3321,7 @@
           <a:p>
             <a:fld id="{C5F7F1F4-5C2A-4188-9FA5-5E04CFA8CF56}" type="datetimeFigureOut">
               <a:rPr lang="en-GB" smtClean="0"/>
-              <a:t>31/08/2018</a:t>
+              <a:t>09/06/2019</a:t>
             </a:fld>
             <a:endParaRPr lang="en-GB"/>
           </a:p>
@@ -3736,7 +3736,7 @@
           <a:p>
             <a:fld id="{C5F7F1F4-5C2A-4188-9FA5-5E04CFA8CF56}" type="datetimeFigureOut">
               <a:rPr lang="en-GB" smtClean="0"/>
-              <a:t>31/08/2018</a:t>
+              <a:t>09/06/2019</a:t>
             </a:fld>
             <a:endParaRPr lang="en-GB"/>
           </a:p>
@@ -3878,7 +3878,7 @@
           <a:p>
             <a:fld id="{C5F7F1F4-5C2A-4188-9FA5-5E04CFA8CF56}" type="datetimeFigureOut">
               <a:rPr lang="en-GB" smtClean="0"/>
-              <a:t>31/08/2018</a:t>
+              <a:t>09/06/2019</a:t>
             </a:fld>
             <a:endParaRPr lang="en-GB"/>
           </a:p>
@@ -3991,7 +3991,7 @@
           <a:p>
             <a:fld id="{C5F7F1F4-5C2A-4188-9FA5-5E04CFA8CF56}" type="datetimeFigureOut">
               <a:rPr lang="en-GB" smtClean="0"/>
-              <a:t>31/08/2018</a:t>
+              <a:t>09/06/2019</a:t>
             </a:fld>
             <a:endParaRPr lang="en-GB"/>
           </a:p>
@@ -4304,7 +4304,7 @@
           <a:p>
             <a:fld id="{C5F7F1F4-5C2A-4188-9FA5-5E04CFA8CF56}" type="datetimeFigureOut">
               <a:rPr lang="en-GB" smtClean="0"/>
-              <a:t>31/08/2018</a:t>
+              <a:t>09/06/2019</a:t>
             </a:fld>
             <a:endParaRPr lang="en-GB"/>
           </a:p>
@@ -4593,7 +4593,7 @@
           <a:p>
             <a:fld id="{C5F7F1F4-5C2A-4188-9FA5-5E04CFA8CF56}" type="datetimeFigureOut">
               <a:rPr lang="en-GB" smtClean="0"/>
-              <a:t>31/08/2018</a:t>
+              <a:t>09/06/2019</a:t>
             </a:fld>
             <a:endParaRPr lang="en-GB"/>
           </a:p>
@@ -4836,7 +4836,7 @@
           <a:p>
             <a:fld id="{C5F7F1F4-5C2A-4188-9FA5-5E04CFA8CF56}" type="datetimeFigureOut">
               <a:rPr lang="en-GB" smtClean="0"/>
-              <a:t>31/08/2018</a:t>
+              <a:t>09/06/2019</a:t>
             </a:fld>
             <a:endParaRPr lang="en-GB"/>
           </a:p>
@@ -5319,6 +5319,53 @@
           </a:p>
         </p:txBody>
       </p:sp>
+      <p:sp>
+        <p:nvSpPr>
+          <p:cNvPr id="2" name="TextBox 1">
+            <a:extLst>
+              <a:ext uri="{FF2B5EF4-FFF2-40B4-BE49-F238E27FC236}">
+                <a16:creationId xmlns:a16="http://schemas.microsoft.com/office/drawing/2014/main" id="{358D125B-6846-49CA-A44B-28A630C13E79}"/>
+              </a:ext>
+            </a:extLst>
+          </p:cNvPr>
+          <p:cNvSpPr txBox="1"/>
+          <p:nvPr/>
+        </p:nvSpPr>
+        <p:spPr>
+          <a:xfrm rot="-2700000">
+            <a:off x="9877653" y="4563616"/>
+            <a:ext cx="363799" cy="246221"/>
+          </a:xfrm>
+          <a:prstGeom prst="rect">
+            <a:avLst/>
+          </a:prstGeom>
+          <a:solidFill>
+            <a:schemeClr val="bg1"/>
+          </a:solidFill>
+        </p:spPr>
+        <p:txBody>
+          <a:bodyPr wrap="square" lIns="0" tIns="0" rIns="0" bIns="0" rtlCol="0">
+            <a:spAutoFit/>
+          </a:bodyPr>
+          <a:lstStyle/>
+          <a:p>
+            <a:r>
+              <a:rPr lang="en-GB" sz="1600" baseline="-25000" dirty="0">
+                <a:latin typeface="Arial" panose="020B0604020202020204" pitchFamily="34" charset="0"/>
+                <a:cs typeface="Arial" panose="020B0604020202020204" pitchFamily="34" charset="0"/>
+              </a:rPr>
+              <a:t>4</a:t>
+            </a:r>
+            <a:r>
+              <a:rPr lang="en-GB" sz="1600" dirty="0">
+                <a:latin typeface="Arial" panose="020B0604020202020204" pitchFamily="34" charset="0"/>
+                <a:cs typeface="Arial" panose="020B0604020202020204" pitchFamily="34" charset="0"/>
+              </a:rPr>
+              <a:t>Cl</a:t>
+            </a:r>
+          </a:p>
+        </p:txBody>
+      </p:sp>
     </p:spTree>
     <p:extLst>
       <p:ext uri="{BB962C8B-B14F-4D97-AF65-F5344CB8AC3E}">

</xml_diff>